<commit_message>
FM modulation code added
</commit_message>
<xml_diff>
--- a/Document/PPT/20231110_AD9910_Meeting.pptx
+++ b/Document/PPT/20231110_AD9910_Meeting.pptx
@@ -5,7 +5,7 @@
     <p:sldMasterId id="2147483648" r:id="rId1"/>
   </p:sldMasterIdLst>
   <p:notesMasterIdLst>
-    <p:notesMasterId r:id="rId13"/>
+    <p:notesMasterId r:id="rId14"/>
   </p:notesMasterIdLst>
   <p:sldIdLst>
     <p:sldId id="256" r:id="rId2"/>
@@ -19,6 +19,7 @@
     <p:sldId id="262" r:id="rId10"/>
     <p:sldId id="263" r:id="rId11"/>
     <p:sldId id="264" r:id="rId12"/>
+    <p:sldId id="272" r:id="rId13"/>
   </p:sldIdLst>
   <p:sldSz cx="12192000" cy="6858000"/>
   <p:notesSz cx="6858000" cy="9144000"/>
@@ -4545,6 +4546,122 @@
     <p:extLst>
       <p:ext uri="{BB962C8B-B14F-4D97-AF65-F5344CB8AC3E}">
         <p14:creationId xmlns:p14="http://schemas.microsoft.com/office/powerpoint/2010/main" val="518651648"/>
+      </p:ext>
+    </p:extLst>
+  </p:cSld>
+  <p:clrMapOvr>
+    <a:masterClrMapping/>
+  </p:clrMapOvr>
+</p:sld>
+</file>
+
+<file path=ppt/slides/slide12.xml><?xml version="1.0" encoding="utf-8"?>
+<p:sld xmlns:a="http://schemas.openxmlformats.org/drawingml/2006/main" xmlns:r="http://schemas.openxmlformats.org/officeDocument/2006/relationships" xmlns:p="http://schemas.openxmlformats.org/presentationml/2006/main">
+  <p:cSld>
+    <p:spTree>
+      <p:nvGrpSpPr>
+        <p:cNvPr id="1" name=""/>
+        <p:cNvGrpSpPr/>
+        <p:nvPr/>
+      </p:nvGrpSpPr>
+      <p:grpSpPr>
+        <a:xfrm>
+          <a:off x="0" y="0"/>
+          <a:ext cx="0" cy="0"/>
+          <a:chOff x="0" y="0"/>
+          <a:chExt cx="0" cy="0"/>
+        </a:xfrm>
+      </p:grpSpPr>
+      <p:sp>
+        <p:nvSpPr>
+          <p:cNvPr id="2" name="제목 1">
+            <a:extLst>
+              <a:ext uri="{FF2B5EF4-FFF2-40B4-BE49-F238E27FC236}">
+                <a16:creationId xmlns:a16="http://schemas.microsoft.com/office/drawing/2014/main" id="{0BC908E7-EAE3-8B52-DCEF-2AA30F1FAE04}"/>
+              </a:ext>
+            </a:extLst>
+          </p:cNvPr>
+          <p:cNvSpPr>
+            <a:spLocks noGrp="1"/>
+          </p:cNvSpPr>
+          <p:nvPr>
+            <p:ph type="title"/>
+          </p:nvPr>
+        </p:nvSpPr>
+        <p:spPr/>
+        <p:txBody>
+          <a:bodyPr/>
+          <a:lstStyle/>
+          <a:p>
+            <a:endParaRPr lang="ko-KR" altLang="en-US"/>
+          </a:p>
+        </p:txBody>
+      </p:sp>
+      <p:sp>
+        <p:nvSpPr>
+          <p:cNvPr id="4" name="날짜 개체 틀 3">
+            <a:extLst>
+              <a:ext uri="{FF2B5EF4-FFF2-40B4-BE49-F238E27FC236}">
+                <a16:creationId xmlns:a16="http://schemas.microsoft.com/office/drawing/2014/main" id="{4C75F997-B18B-50EE-10BA-40325FC36C9B}"/>
+              </a:ext>
+            </a:extLst>
+          </p:cNvPr>
+          <p:cNvSpPr>
+            <a:spLocks noGrp="1"/>
+          </p:cNvSpPr>
+          <p:nvPr>
+            <p:ph type="dt" sz="half" idx="10"/>
+          </p:nvPr>
+        </p:nvSpPr>
+        <p:spPr/>
+        <p:txBody>
+          <a:bodyPr/>
+          <a:lstStyle/>
+          <a:p>
+            <a:r>
+              <a:rPr kumimoji="1" lang="en-US" altLang="ko-KR">
+                <a:ea typeface="Verdana" panose="020B0604030504040204" pitchFamily="34" charset="0"/>
+              </a:rPr>
+              <a:t>2023. 3. 29.</a:t>
+            </a:r>
+            <a:endParaRPr kumimoji="1" lang="ko-Kore-KR" altLang="en-US" dirty="0"/>
+          </a:p>
+        </p:txBody>
+      </p:sp>
+      <p:pic>
+        <p:nvPicPr>
+          <p:cNvPr id="6" name="그림 5">
+            <a:extLst>
+              <a:ext uri="{FF2B5EF4-FFF2-40B4-BE49-F238E27FC236}">
+                <a16:creationId xmlns:a16="http://schemas.microsoft.com/office/drawing/2014/main" id="{D91A1A39-D907-0DA9-10B7-337DEFE389EE}"/>
+              </a:ext>
+            </a:extLst>
+          </p:cNvPr>
+          <p:cNvPicPr>
+            <a:picLocks noChangeAspect="1"/>
+          </p:cNvPicPr>
+          <p:nvPr/>
+        </p:nvPicPr>
+        <p:blipFill>
+          <a:blip r:embed="rId2"/>
+          <a:stretch>
+            <a:fillRect/>
+          </a:stretch>
+        </p:blipFill>
+        <p:spPr>
+          <a:xfrm>
+            <a:off x="2011512" y="1301750"/>
+            <a:ext cx="8168976" cy="5029200"/>
+          </a:xfrm>
+          <a:prstGeom prst="rect">
+            <a:avLst/>
+          </a:prstGeom>
+        </p:spPr>
+      </p:pic>
+    </p:spTree>
+    <p:extLst>
+      <p:ext uri="{BB962C8B-B14F-4D97-AF65-F5344CB8AC3E}">
+        <p14:creationId xmlns:p14="http://schemas.microsoft.com/office/powerpoint/2010/main" val="1530034085"/>
       </p:ext>
     </p:extLst>
   </p:cSld>

</xml_diff>